<commit_message>
work on linear index
</commit_message>
<xml_diff>
--- a/sprints/Sprint 7 - Dec 4 - Dec 10 - Review.pptx
+++ b/sprints/Sprint 7 - Dec 4 - Dec 10 - Review.pptx
@@ -197,7 +197,7 @@
           <a:p>
             <a:fld id="{68B00D8E-BD79-47BE-AA74-0D4716B611F1}" type="datetimeFigureOut">
               <a:rPr lang="en-US" smtClean="0"/>
-              <a:t>12/17/2016</a:t>
+              <a:t>12/23/2016</a:t>
             </a:fld>
             <a:endParaRPr lang="en-US"/>
           </a:p>
@@ -554,7 +554,7 @@
             <a:fld id="{81331B57-0BE5-4F82-AA58-76F53EFF3ADA}" type="datetime8">
               <a:rPr lang="en-US" smtClean="0"/>
               <a:pPr/>
-              <a:t>12/17/2016 8:47 PM</a:t>
+              <a:t>12/23/2016 4:35 PM</a:t>
             </a:fld>
             <a:endParaRPr lang="en-US" dirty="0"/>
           </a:p>
@@ -749,7 +749,7 @@
             <a:fld id="{81331B57-0BE5-4F82-AA58-76F53EFF3ADA}" type="datetime8">
               <a:rPr lang="en-US" smtClean="0"/>
               <a:pPr/>
-              <a:t>12/17/2016 8:47 PM</a:t>
+              <a:t>12/23/2016 4:35 PM</a:t>
             </a:fld>
             <a:endParaRPr lang="en-US"/>
           </a:p>
@@ -934,7 +934,7 @@
             <a:fld id="{81331B57-0BE5-4F82-AA58-76F53EFF3ADA}" type="datetime8">
               <a:rPr lang="en-US" smtClean="0"/>
               <a:pPr/>
-              <a:t>12/17/2016 8:47 PM</a:t>
+              <a:t>12/23/2016 4:35 PM</a:t>
             </a:fld>
             <a:endParaRPr lang="en-US"/>
           </a:p>
@@ -1119,7 +1119,7 @@
             <a:fld id="{81331B57-0BE5-4F82-AA58-76F53EFF3ADA}" type="datetime8">
               <a:rPr lang="en-US" smtClean="0"/>
               <a:pPr/>
-              <a:t>12/17/2016 8:47 PM</a:t>
+              <a:t>12/23/2016 4:35 PM</a:t>
             </a:fld>
             <a:endParaRPr lang="en-US"/>
           </a:p>
@@ -1304,7 +1304,7 @@
             <a:fld id="{81331B57-0BE5-4F82-AA58-76F53EFF3ADA}" type="datetime8">
               <a:rPr lang="en-US" smtClean="0"/>
               <a:pPr/>
-              <a:t>12/17/2016 8:47 PM</a:t>
+              <a:t>12/23/2016 4:35 PM</a:t>
             </a:fld>
             <a:endParaRPr lang="en-US"/>
           </a:p>
@@ -4615,15 +4615,7 @@
             </a:r>
             <a:r>
               <a:rPr lang="en-US" dirty="0" smtClean="0"/>
-              <a:t> – Sprint 7 </a:t>
-            </a:r>
-            <a:r>
-              <a:rPr lang="en-US" dirty="0" smtClean="0"/>
-              <a:t>Review</a:t>
-            </a:r>
-            <a:r>
-              <a:rPr lang="en-US" dirty="0" smtClean="0"/>
-              <a:t/>
+              <a:t> – Sprint 7 Review</a:t>
             </a:r>
             <a:br>
               <a:rPr lang="en-US" dirty="0" smtClean="0"/>
@@ -4770,7 +4762,19 @@
                   </a:schemeClr>
                 </a:solidFill>
               </a:rPr>
-              <a:t>(1 story pts</a:t>
+              <a:t>(1 story pts) – 100%</a:t>
+            </a:r>
+          </a:p>
+          <a:p>
+            <a:pPr marL="0" indent="0">
+              <a:buNone/>
+            </a:pPr>
+            <a:endParaRPr lang="en-US" dirty="0" smtClean="0"/>
+          </a:p>
+          <a:p>
+            <a:r>
+              <a:rPr lang="en-US" dirty="0" smtClean="0"/>
+              <a:t>Support Query Operations from Collection </a:t>
             </a:r>
             <a:r>
               <a:rPr lang="en-US" dirty="0" smtClean="0">
@@ -4780,54 +4784,8 @@
                   </a:schemeClr>
                 </a:solidFill>
               </a:rPr>
-              <a:t>) – 100%</a:t>
-            </a:r>
-            <a:endParaRPr lang="en-US" dirty="0" smtClean="0">
-              <a:solidFill>
-                <a:schemeClr val="tx1">
-                  <a:lumMod val="65000"/>
-                </a:schemeClr>
-              </a:solidFill>
-            </a:endParaRPr>
-          </a:p>
-          <a:p>
-            <a:pPr marL="0" indent="0">
-              <a:buNone/>
-            </a:pPr>
-            <a:endParaRPr lang="en-US" dirty="0" smtClean="0"/>
-          </a:p>
-          <a:p>
-            <a:r>
-              <a:rPr lang="en-US" dirty="0" smtClean="0"/>
-              <a:t>Support Query Operations from Collection </a:t>
-            </a:r>
-            <a:r>
-              <a:rPr lang="en-US" dirty="0" smtClean="0">
-                <a:solidFill>
-                  <a:schemeClr val="tx1">
-                    <a:lumMod val="65000"/>
-                  </a:schemeClr>
-                </a:solidFill>
-              </a:rPr>
-              <a:t>(2 story pts</a:t>
-            </a:r>
-            <a:r>
-              <a:rPr lang="en-US" dirty="0" smtClean="0">
-                <a:solidFill>
-                  <a:schemeClr val="tx1">
-                    <a:lumMod val="65000"/>
-                  </a:schemeClr>
-                </a:solidFill>
-              </a:rPr>
-              <a:t>) – 75%</a:t>
-            </a:r>
-            <a:endParaRPr lang="en-US" dirty="0" smtClean="0">
-              <a:solidFill>
-                <a:schemeClr val="tx1">
-                  <a:lumMod val="65000"/>
-                </a:schemeClr>
-              </a:solidFill>
-            </a:endParaRPr>
+              <a:t>(2 story pts) – 75%</a:t>
+            </a:r>
           </a:p>
           <a:p>
             <a:pPr marL="0" indent="0">
@@ -4884,13 +4842,6 @@
               </a:rPr>
               <a:t>) – 75%</a:t>
             </a:r>
-            <a:endParaRPr lang="en-US" dirty="0" smtClean="0">
-              <a:solidFill>
-                <a:schemeClr val="tx1">
-                  <a:lumMod val="65000"/>
-                </a:schemeClr>
-              </a:solidFill>
-            </a:endParaRPr>
           </a:p>
           <a:p>
             <a:pPr marL="0" indent="0">
@@ -4907,25 +4858,8 @@
                   </a:schemeClr>
                 </a:solidFill>
               </a:rPr>
-              <a:t>Total Story Points: </a:t>
-            </a:r>
-            <a:r>
-              <a:rPr lang="en-US" dirty="0" smtClean="0">
-                <a:solidFill>
-                  <a:schemeClr val="tx1">
-                    <a:lumMod val="65000"/>
-                  </a:schemeClr>
-                </a:solidFill>
-              </a:rPr>
-              <a:t>4</a:t>
-            </a:r>
-            <a:endParaRPr lang="en-US" dirty="0" smtClean="0">
-              <a:solidFill>
-                <a:schemeClr val="tx1">
-                  <a:lumMod val="65000"/>
-                </a:schemeClr>
-              </a:solidFill>
-            </a:endParaRPr>
+              <a:t>Total Story Points: 4</a:t>
+            </a:r>
           </a:p>
           <a:p>
             <a:endParaRPr lang="en-US" dirty="0"/>
@@ -5011,7 +4945,7 @@
         <p:spPr>
           <a:xfrm>
             <a:off x="381000" y="1096423"/>
-            <a:ext cx="8382000" cy="3336298"/>
+            <a:ext cx="8382000" cy="3724096"/>
           </a:xfrm>
         </p:spPr>
         <p:txBody>
@@ -5033,8 +4967,29 @@
             <a:pPr lvl="1"/>
             <a:r>
               <a:rPr lang="en-US" dirty="0" smtClean="0"/>
-              <a:t>Fix echo problem with calculating test results </a:t>
-            </a:r>
+              <a:t>Fix echo problem with calculating test </a:t>
+            </a:r>
+            <a:r>
+              <a:rPr lang="en-US" dirty="0" smtClean="0"/>
+              <a:t>results </a:t>
+            </a:r>
+            <a:r>
+              <a:rPr lang="en-US" dirty="0" smtClean="0">
+                <a:solidFill>
+                  <a:schemeClr val="tx1">
+                    <a:lumMod val="65000"/>
+                  </a:schemeClr>
+                </a:solidFill>
+              </a:rPr>
+              <a:t>[DONE] </a:t>
+            </a:r>
+            <a:endParaRPr lang="en-US" dirty="0" smtClean="0">
+              <a:solidFill>
+                <a:schemeClr val="tx1">
+                  <a:lumMod val="65000"/>
+                </a:schemeClr>
+              </a:solidFill>
+            </a:endParaRPr>
           </a:p>
           <a:p>
             <a:pPr lvl="1"/>
@@ -5060,13 +5015,6 @@
               </a:rPr>
               <a:t>[DONE]</a:t>
             </a:r>
-            <a:endParaRPr lang="en-US" dirty="0" smtClean="0">
-              <a:solidFill>
-                <a:schemeClr val="tx1">
-                  <a:lumMod val="65000"/>
-                </a:schemeClr>
-              </a:solidFill>
-            </a:endParaRPr>
           </a:p>
           <a:p>
             <a:pPr marL="517525" lvl="1" indent="0">
@@ -5192,13 +5140,6 @@
               </a:rPr>
               <a:t>[DONE]</a:t>
             </a:r>
-            <a:endParaRPr lang="en-US" dirty="0" smtClean="0">
-              <a:solidFill>
-                <a:schemeClr val="tx1">
-                  <a:lumMod val="65000"/>
-                </a:schemeClr>
-              </a:solidFill>
-            </a:endParaRPr>
           </a:p>
           <a:p>
             <a:endParaRPr lang="en-US" dirty="0" smtClean="0"/>
@@ -5226,13 +5167,6 @@
               </a:rPr>
               <a:t>[DONE]</a:t>
             </a:r>
-            <a:endParaRPr lang="en-US" dirty="0" smtClean="0">
-              <a:solidFill>
-                <a:schemeClr val="tx1">
-                  <a:lumMod val="65000"/>
-                </a:schemeClr>
-              </a:solidFill>
-            </a:endParaRPr>
           </a:p>
           <a:p>
             <a:pPr marL="517525" lvl="1" indent="0">
@@ -5263,13 +5197,6 @@
               </a:rPr>
               <a:t>[partial]</a:t>
             </a:r>
-            <a:endParaRPr lang="en-US" dirty="0" smtClean="0">
-              <a:solidFill>
-                <a:schemeClr val="tx1">
-                  <a:lumMod val="65000"/>
-                </a:schemeClr>
-              </a:solidFill>
-            </a:endParaRPr>
           </a:p>
         </p:txBody>
       </p:sp>
@@ -5371,11 +5298,7 @@
           <a:p>
             <a:r>
               <a:rPr lang="en-US" dirty="0" smtClean="0"/>
-              <a:t>Add Options for </a:t>
-            </a:r>
-            <a:r>
-              <a:rPr lang="en-US" dirty="0" smtClean="0"/>
-              <a:t>Reader </a:t>
+              <a:t>Add Options for Reader </a:t>
             </a:r>
             <a:r>
               <a:rPr lang="en-US" dirty="0" smtClean="0">
@@ -5409,13 +5332,6 @@
               </a:rPr>
               <a:t>[DONE]</a:t>
             </a:r>
-            <a:endParaRPr lang="en-US" dirty="0" smtClean="0">
-              <a:solidFill>
-                <a:schemeClr val="tx1">
-                  <a:lumMod val="65000"/>
-                </a:schemeClr>
-              </a:solidFill>
-            </a:endParaRPr>
           </a:p>
           <a:p>
             <a:pPr lvl="1"/>
@@ -5453,23 +5369,14 @@
           <a:p>
             <a:r>
               <a:rPr lang="en-US" dirty="0" smtClean="0"/>
-              <a:t>Add Options for </a:t>
-            </a:r>
+              <a:t>Add Options for Select</a:t>
+            </a:r>
+          </a:p>
+          <a:p>
+            <a:pPr lvl="1"/>
             <a:r>
               <a:rPr lang="en-US" dirty="0" smtClean="0"/>
-              <a:t>Select</a:t>
-            </a:r>
-            <a:endParaRPr lang="en-US" dirty="0" smtClean="0"/>
-          </a:p>
-          <a:p>
-            <a:pPr lvl="1"/>
-            <a:r>
-              <a:rPr lang="en-US" dirty="0" smtClean="0"/>
-              <a:t>Select w/o </a:t>
-            </a:r>
-            <a:r>
-              <a:rPr lang="en-US" dirty="0" smtClean="0"/>
-              <a:t>where </a:t>
+              <a:t>Select w/o where </a:t>
             </a:r>
             <a:r>
               <a:rPr lang="en-US" dirty="0" smtClean="0">
@@ -5481,23 +5388,12 @@
               </a:rPr>
               <a:t>[DONE]</a:t>
             </a:r>
-            <a:endParaRPr lang="en-US" dirty="0" smtClean="0">
-              <a:solidFill>
-                <a:schemeClr val="tx1">
-                  <a:lumMod val="65000"/>
-                </a:schemeClr>
-              </a:solidFill>
-            </a:endParaRPr>
           </a:p>
           <a:p>
             <a:pPr lvl="1"/>
             <a:r>
               <a:rPr lang="en-US" dirty="0" smtClean="0"/>
-              <a:t>Select with where </a:t>
-            </a:r>
-            <a:r>
-              <a:rPr lang="en-US" dirty="0" smtClean="0"/>
-              <a:t>clause </a:t>
+              <a:t>Select with where clause </a:t>
             </a:r>
             <a:r>
               <a:rPr lang="en-US" dirty="0" smtClean="0">
@@ -5509,13 +5405,6 @@
               </a:rPr>
               <a:t>[NOT DONE]</a:t>
             </a:r>
-            <a:endParaRPr lang="en-US" dirty="0" smtClean="0">
-              <a:solidFill>
-                <a:schemeClr val="tx1">
-                  <a:lumMod val="65000"/>
-                </a:schemeClr>
-              </a:solidFill>
-            </a:endParaRPr>
           </a:p>
         </p:txBody>
       </p:sp>

</xml_diff>